<commit_message>
added some additional notes
</commit_message>
<xml_diff>
--- a/2013/trekPlanning/TrekPlanningLocations.pptx
+++ b/2013/trekPlanning/TrekPlanningLocations.pptx
@@ -3611,7 +3611,7 @@
         </p:nvSpPr>
         <p:spPr>
           <a:xfrm>
-            <a:off x="5809673" y="2088422"/>
+            <a:off x="5701916" y="518240"/>
             <a:ext cx="2503054" cy="2677656"/>
           </a:xfrm>
           <a:prstGeom prst="rect">
@@ -3722,6 +3722,135 @@
               <a:t>9. Desolation wilderness</a:t>
             </a:r>
             <a:endParaRPr lang="en-US" sz="1200" dirty="0"/>
+          </a:p>
+        </p:txBody>
+      </p:sp>
+      <p:sp>
+        <p:nvSpPr>
+          <p:cNvPr id="8" name="Rectangle 7"/>
+          <p:cNvSpPr/>
+          <p:nvPr/>
+        </p:nvSpPr>
+        <p:spPr>
+          <a:xfrm>
+            <a:off x="5769650" y="3572397"/>
+            <a:ext cx="2503054" cy="2308324"/>
+          </a:xfrm>
+          <a:prstGeom prst="rect">
+            <a:avLst/>
+          </a:prstGeom>
+          <a:solidFill>
+            <a:schemeClr val="accent2">
+              <a:lumMod val="40000"/>
+              <a:lumOff val="60000"/>
+            </a:schemeClr>
+          </a:solidFill>
+          <a:ln>
+            <a:solidFill>
+              <a:srgbClr val="4F6228"/>
+            </a:solidFill>
+          </a:ln>
+        </p:spPr>
+        <p:txBody>
+          <a:bodyPr wrap="square">
+            <a:spAutoFit/>
+          </a:bodyPr>
+          <a:lstStyle/>
+          <a:p>
+            <a:r>
+              <a:rPr lang="en-US" sz="1200" dirty="0" smtClean="0"/>
+              <a:t>Getaway Top 10 N CA Hiking Treks:</a:t>
+            </a:r>
+          </a:p>
+          <a:p>
+            <a:endParaRPr lang="en-US" sz="1200" dirty="0"/>
+          </a:p>
+          <a:p>
+            <a:pPr marL="228600" indent="-228600">
+              <a:buAutoNum type="arabicPeriod"/>
+            </a:pPr>
+            <a:r>
+              <a:rPr lang="en-US" sz="1200" dirty="0" smtClean="0"/>
+              <a:t>Point Reyes</a:t>
+            </a:r>
+          </a:p>
+          <a:p>
+            <a:pPr marL="228600" indent="-228600">
+              <a:buAutoNum type="arabicPeriod"/>
+            </a:pPr>
+            <a:r>
+              <a:rPr lang="en-US" sz="1200" dirty="0" smtClean="0"/>
+              <a:t>Lost Coast</a:t>
+            </a:r>
+          </a:p>
+          <a:p>
+            <a:pPr marL="228600" indent="-228600">
+              <a:buAutoNum type="arabicPeriod"/>
+            </a:pPr>
+            <a:r>
+              <a:rPr lang="en-US" sz="1200" dirty="0" smtClean="0"/>
+              <a:t>Lake Del Valle</a:t>
+            </a:r>
+          </a:p>
+          <a:p>
+            <a:pPr marL="228600" indent="-228600">
+              <a:buAutoNum type="arabicPeriod"/>
+            </a:pPr>
+            <a:r>
+              <a:rPr lang="en-US" sz="1200" dirty="0" smtClean="0"/>
+              <a:t>Yosemite</a:t>
+            </a:r>
+          </a:p>
+          <a:p>
+            <a:pPr marL="228600" indent="-228600">
+              <a:buAutoNum type="arabicPeriod"/>
+            </a:pPr>
+            <a:r>
+              <a:rPr lang="en-US" sz="1200" dirty="0" smtClean="0"/>
+              <a:t>Big Sur</a:t>
+            </a:r>
+          </a:p>
+          <a:p>
+            <a:pPr marL="228600" indent="-228600">
+              <a:buAutoNum type="arabicPeriod"/>
+            </a:pPr>
+            <a:r>
+              <a:rPr lang="en-US" sz="1200" dirty="0" smtClean="0"/>
+              <a:t>Redwood National Forest</a:t>
+            </a:r>
+          </a:p>
+          <a:p>
+            <a:pPr marL="228600" indent="-228600">
+              <a:buAutoNum type="arabicPeriod"/>
+            </a:pPr>
+            <a:r>
+              <a:rPr lang="en-US" sz="1200" dirty="0" smtClean="0"/>
+              <a:t>Lassen Volcanic National Park</a:t>
+            </a:r>
+          </a:p>
+          <a:p>
+            <a:pPr marL="228600" indent="-228600">
+              <a:buAutoNum type="arabicPeriod"/>
+            </a:pPr>
+            <a:r>
+              <a:rPr lang="en-US" sz="1200" dirty="0" smtClean="0"/>
+              <a:t>Pinnacles</a:t>
+            </a:r>
+          </a:p>
+          <a:p>
+            <a:pPr marL="228600" indent="-228600">
+              <a:buAutoNum type="arabicPeriod"/>
+            </a:pPr>
+            <a:r>
+              <a:rPr lang="en-US" sz="1200" dirty="0" smtClean="0"/>
+              <a:t>Mt Shasta</a:t>
+            </a:r>
+          </a:p>
+          <a:p>
+            <a:r>
+              <a:rPr lang="en-US" sz="1200" dirty="0" smtClean="0"/>
+              <a:t>10. My Whitney </a:t>
+            </a:r>
           </a:p>
         </p:txBody>
       </p:sp>

</xml_diff>